<commit_message>
keep PDF title page; add solution icon
</commit_message>
<xml_diff>
--- a/images/icons.pptx
+++ b/images/icons.pptx
@@ -241,7 +241,7 @@
           <a:p>
             <a:fld id="{81AA1A57-BA19-4BF1-99AE-E8ABE920CB96}" type="datetimeFigureOut">
               <a:rPr lang="en-US" smtClean="0"/>
-              <a:t>8/18/2016</a:t>
+              <a:t>4/28/2017</a:t>
             </a:fld>
             <a:endParaRPr lang="en-US"/>
           </a:p>
@@ -409,7 +409,7 @@
           <a:p>
             <a:fld id="{81AA1A57-BA19-4BF1-99AE-E8ABE920CB96}" type="datetimeFigureOut">
               <a:rPr lang="en-US" smtClean="0"/>
-              <a:t>8/18/2016</a:t>
+              <a:t>4/28/2017</a:t>
             </a:fld>
             <a:endParaRPr lang="en-US"/>
           </a:p>
@@ -587,7 +587,7 @@
           <a:p>
             <a:fld id="{81AA1A57-BA19-4BF1-99AE-E8ABE920CB96}" type="datetimeFigureOut">
               <a:rPr lang="en-US" smtClean="0"/>
-              <a:t>8/18/2016</a:t>
+              <a:t>4/28/2017</a:t>
             </a:fld>
             <a:endParaRPr lang="en-US"/>
           </a:p>
@@ -755,7 +755,7 @@
           <a:p>
             <a:fld id="{81AA1A57-BA19-4BF1-99AE-E8ABE920CB96}" type="datetimeFigureOut">
               <a:rPr lang="en-US" smtClean="0"/>
-              <a:t>8/18/2016</a:t>
+              <a:t>4/28/2017</a:t>
             </a:fld>
             <a:endParaRPr lang="en-US"/>
           </a:p>
@@ -1000,7 +1000,7 @@
           <a:p>
             <a:fld id="{81AA1A57-BA19-4BF1-99AE-E8ABE920CB96}" type="datetimeFigureOut">
               <a:rPr lang="en-US" smtClean="0"/>
-              <a:t>8/18/2016</a:t>
+              <a:t>4/28/2017</a:t>
             </a:fld>
             <a:endParaRPr lang="en-US"/>
           </a:p>
@@ -1229,7 +1229,7 @@
           <a:p>
             <a:fld id="{81AA1A57-BA19-4BF1-99AE-E8ABE920CB96}" type="datetimeFigureOut">
               <a:rPr lang="en-US" smtClean="0"/>
-              <a:t>8/18/2016</a:t>
+              <a:t>4/28/2017</a:t>
             </a:fld>
             <a:endParaRPr lang="en-US"/>
           </a:p>
@@ -1593,7 +1593,7 @@
           <a:p>
             <a:fld id="{81AA1A57-BA19-4BF1-99AE-E8ABE920CB96}" type="datetimeFigureOut">
               <a:rPr lang="en-US" smtClean="0"/>
-              <a:t>8/18/2016</a:t>
+              <a:t>4/28/2017</a:t>
             </a:fld>
             <a:endParaRPr lang="en-US"/>
           </a:p>
@@ -1710,7 +1710,7 @@
           <a:p>
             <a:fld id="{81AA1A57-BA19-4BF1-99AE-E8ABE920CB96}" type="datetimeFigureOut">
               <a:rPr lang="en-US" smtClean="0"/>
-              <a:t>8/18/2016</a:t>
+              <a:t>4/28/2017</a:t>
             </a:fld>
             <a:endParaRPr lang="en-US"/>
           </a:p>
@@ -1805,7 +1805,7 @@
           <a:p>
             <a:fld id="{81AA1A57-BA19-4BF1-99AE-E8ABE920CB96}" type="datetimeFigureOut">
               <a:rPr lang="en-US" smtClean="0"/>
-              <a:t>8/18/2016</a:t>
+              <a:t>4/28/2017</a:t>
             </a:fld>
             <a:endParaRPr lang="en-US"/>
           </a:p>
@@ -2080,7 +2080,7 @@
           <a:p>
             <a:fld id="{81AA1A57-BA19-4BF1-99AE-E8ABE920CB96}" type="datetimeFigureOut">
               <a:rPr lang="en-US" smtClean="0"/>
-              <a:t>8/18/2016</a:t>
+              <a:t>4/28/2017</a:t>
             </a:fld>
             <a:endParaRPr lang="en-US"/>
           </a:p>
@@ -2332,7 +2332,7 @@
           <a:p>
             <a:fld id="{81AA1A57-BA19-4BF1-99AE-E8ABE920CB96}" type="datetimeFigureOut">
               <a:rPr lang="en-US" smtClean="0"/>
-              <a:t>8/18/2016</a:t>
+              <a:t>4/28/2017</a:t>
             </a:fld>
             <a:endParaRPr lang="en-US"/>
           </a:p>
@@ -2543,7 +2543,7 @@
           <a:p>
             <a:fld id="{81AA1A57-BA19-4BF1-99AE-E8ABE920CB96}" type="datetimeFigureOut">
               <a:rPr lang="en-US" smtClean="0"/>
-              <a:t>8/18/2016</a:t>
+              <a:t>4/28/2017</a:t>
             </a:fld>
             <a:endParaRPr lang="en-US"/>
           </a:p>
@@ -3054,6 +3054,168 @@
           </a:p>
         </p:txBody>
       </p:sp>
+      <p:sp>
+        <p:nvSpPr>
+          <p:cNvPr id="4" name="Donut 3"/>
+          <p:cNvSpPr/>
+          <p:nvPr/>
+        </p:nvSpPr>
+        <p:spPr>
+          <a:xfrm>
+            <a:off x="653249" y="1376618"/>
+            <a:ext cx="914400" cy="914400"/>
+          </a:xfrm>
+          <a:prstGeom prst="donut">
+            <a:avLst>
+              <a:gd name="adj" fmla="val 6613"/>
+            </a:avLst>
+          </a:prstGeom>
+          <a:ln>
+            <a:noFill/>
+          </a:ln>
+          <a:effectLst>
+            <a:outerShdw blurRad="63500" sx="102000" sy="102000" algn="ctr" rotWithShape="0">
+              <a:prstClr val="black">
+                <a:alpha val="40000"/>
+              </a:prstClr>
+            </a:outerShdw>
+          </a:effectLst>
+        </p:spPr>
+        <p:style>
+          <a:lnRef idx="2">
+            <a:schemeClr val="accent6">
+              <a:shade val="50000"/>
+            </a:schemeClr>
+          </a:lnRef>
+          <a:fillRef idx="1">
+            <a:schemeClr val="accent6"/>
+          </a:fillRef>
+          <a:effectRef idx="0">
+            <a:schemeClr val="accent6"/>
+          </a:effectRef>
+          <a:fontRef idx="minor">
+            <a:schemeClr val="lt1"/>
+          </a:fontRef>
+        </p:style>
+        <p:txBody>
+          <a:bodyPr rtlCol="0" anchor="ctr"/>
+          <a:lstStyle/>
+          <a:p>
+            <a:pPr algn="ctr"/>
+            <a:endParaRPr lang="en-US">
+              <a:solidFill>
+                <a:schemeClr val="tx1"/>
+              </a:solidFill>
+            </a:endParaRPr>
+          </a:p>
+        </p:txBody>
+      </p:sp>
+      <p:sp>
+        <p:nvSpPr>
+          <p:cNvPr id="5" name="TextBox 4"/>
+          <p:cNvSpPr txBox="1"/>
+          <p:nvPr/>
+        </p:nvSpPr>
+        <p:spPr>
+          <a:xfrm>
+            <a:off x="653249" y="112609"/>
+            <a:ext cx="870751" cy="1015663"/>
+          </a:xfrm>
+          <a:prstGeom prst="rect">
+            <a:avLst/>
+          </a:prstGeom>
+          <a:noFill/>
+        </p:spPr>
+        <p:txBody>
+          <a:bodyPr wrap="none" rtlCol="0">
+            <a:spAutoFit/>
+          </a:bodyPr>
+          <a:lstStyle/>
+          <a:p>
+            <a:r>
+              <a:rPr lang="en-US" sz="6000" b="1" dirty="0" smtClean="0">
+                <a:solidFill>
+                  <a:schemeClr val="accent6"/>
+                </a:solidFill>
+                <a:effectLst>
+                  <a:outerShdw blurRad="63500" sx="102000" sy="102000" algn="ctr" rotWithShape="0">
+                    <a:prstClr val="black">
+                      <a:alpha val="40000"/>
+                    </a:prstClr>
+                  </a:outerShdw>
+                </a:effectLst>
+                <a:sym typeface="Wingdings" panose="05000000000000000000" pitchFamily="2" charset="2"/>
+              </a:rPr>
+              <a:t></a:t>
+            </a:r>
+            <a:endParaRPr lang="en-US" sz="6000" b="1" dirty="0">
+              <a:solidFill>
+                <a:schemeClr val="accent6"/>
+              </a:solidFill>
+              <a:effectLst>
+                <a:outerShdw blurRad="63500" sx="102000" sy="102000" algn="ctr" rotWithShape="0">
+                  <a:prstClr val="black">
+                    <a:alpha val="40000"/>
+                  </a:prstClr>
+                </a:outerShdw>
+              </a:effectLst>
+            </a:endParaRPr>
+          </a:p>
+        </p:txBody>
+      </p:sp>
+      <p:sp>
+        <p:nvSpPr>
+          <p:cNvPr id="6" name="TextBox 5"/>
+          <p:cNvSpPr txBox="1"/>
+          <p:nvPr/>
+        </p:nvSpPr>
+        <p:spPr>
+          <a:xfrm>
+            <a:off x="694124" y="1423033"/>
+            <a:ext cx="788999" cy="1015663"/>
+          </a:xfrm>
+          <a:prstGeom prst="rect">
+            <a:avLst/>
+          </a:prstGeom>
+          <a:noFill/>
+        </p:spPr>
+        <p:txBody>
+          <a:bodyPr wrap="none" rtlCol="0">
+            <a:spAutoFit/>
+          </a:bodyPr>
+          <a:lstStyle/>
+          <a:p>
+            <a:r>
+              <a:rPr lang="en-US" sz="6000" b="1" dirty="0">
+                <a:solidFill>
+                  <a:schemeClr val="accent6"/>
+                </a:solidFill>
+                <a:effectLst>
+                  <a:outerShdw blurRad="63500" sx="102000" sy="102000" algn="ctr" rotWithShape="0">
+                    <a:prstClr val="black">
+                      <a:alpha val="40000"/>
+                    </a:prstClr>
+                  </a:outerShdw>
+                </a:effectLst>
+                <a:sym typeface="Wingdings" panose="05000000000000000000" pitchFamily="2" charset="2"/>
+              </a:rPr>
+              <a:t></a:t>
+            </a:r>
+            <a:endParaRPr lang="en-US" sz="6000" b="1" dirty="0">
+              <a:solidFill>
+                <a:schemeClr val="accent6"/>
+              </a:solidFill>
+              <a:effectLst>
+                <a:outerShdw blurRad="63500" sx="102000" sy="102000" algn="ctr" rotWithShape="0">
+                  <a:prstClr val="black">
+                    <a:alpha val="40000"/>
+                  </a:prstClr>
+                </a:outerShdw>
+              </a:effectLst>
+            </a:endParaRPr>
+          </a:p>
+        </p:txBody>
+      </p:sp>
     </p:spTree>
     <p:extLst>
       <p:ext uri="{BB962C8B-B14F-4D97-AF65-F5344CB8AC3E}">

</xml_diff>

<commit_message>
solutions icon in PPTX
</commit_message>
<xml_diff>
--- a/images/icons.pptx
+++ b/images/icons.pptx
@@ -241,7 +241,7 @@
           <a:p>
             <a:fld id="{81AA1A57-BA19-4BF1-99AE-E8ABE920CB96}" type="datetimeFigureOut">
               <a:rPr lang="en-US" smtClean="0"/>
-              <a:t>4/28/2017</a:t>
+              <a:t>8/18/2016</a:t>
             </a:fld>
             <a:endParaRPr lang="en-US"/>
           </a:p>
@@ -409,7 +409,7 @@
           <a:p>
             <a:fld id="{81AA1A57-BA19-4BF1-99AE-E8ABE920CB96}" type="datetimeFigureOut">
               <a:rPr lang="en-US" smtClean="0"/>
-              <a:t>4/28/2017</a:t>
+              <a:t>8/18/2016</a:t>
             </a:fld>
             <a:endParaRPr lang="en-US"/>
           </a:p>
@@ -587,7 +587,7 @@
           <a:p>
             <a:fld id="{81AA1A57-BA19-4BF1-99AE-E8ABE920CB96}" type="datetimeFigureOut">
               <a:rPr lang="en-US" smtClean="0"/>
-              <a:t>4/28/2017</a:t>
+              <a:t>8/18/2016</a:t>
             </a:fld>
             <a:endParaRPr lang="en-US"/>
           </a:p>
@@ -755,7 +755,7 @@
           <a:p>
             <a:fld id="{81AA1A57-BA19-4BF1-99AE-E8ABE920CB96}" type="datetimeFigureOut">
               <a:rPr lang="en-US" smtClean="0"/>
-              <a:t>4/28/2017</a:t>
+              <a:t>8/18/2016</a:t>
             </a:fld>
             <a:endParaRPr lang="en-US"/>
           </a:p>
@@ -1000,7 +1000,7 @@
           <a:p>
             <a:fld id="{81AA1A57-BA19-4BF1-99AE-E8ABE920CB96}" type="datetimeFigureOut">
               <a:rPr lang="en-US" smtClean="0"/>
-              <a:t>4/28/2017</a:t>
+              <a:t>8/18/2016</a:t>
             </a:fld>
             <a:endParaRPr lang="en-US"/>
           </a:p>
@@ -1229,7 +1229,7 @@
           <a:p>
             <a:fld id="{81AA1A57-BA19-4BF1-99AE-E8ABE920CB96}" type="datetimeFigureOut">
               <a:rPr lang="en-US" smtClean="0"/>
-              <a:t>4/28/2017</a:t>
+              <a:t>8/18/2016</a:t>
             </a:fld>
             <a:endParaRPr lang="en-US"/>
           </a:p>
@@ -1593,7 +1593,7 @@
           <a:p>
             <a:fld id="{81AA1A57-BA19-4BF1-99AE-E8ABE920CB96}" type="datetimeFigureOut">
               <a:rPr lang="en-US" smtClean="0"/>
-              <a:t>4/28/2017</a:t>
+              <a:t>8/18/2016</a:t>
             </a:fld>
             <a:endParaRPr lang="en-US"/>
           </a:p>
@@ -1710,7 +1710,7 @@
           <a:p>
             <a:fld id="{81AA1A57-BA19-4BF1-99AE-E8ABE920CB96}" type="datetimeFigureOut">
               <a:rPr lang="en-US" smtClean="0"/>
-              <a:t>4/28/2017</a:t>
+              <a:t>8/18/2016</a:t>
             </a:fld>
             <a:endParaRPr lang="en-US"/>
           </a:p>
@@ -1805,7 +1805,7 @@
           <a:p>
             <a:fld id="{81AA1A57-BA19-4BF1-99AE-E8ABE920CB96}" type="datetimeFigureOut">
               <a:rPr lang="en-US" smtClean="0"/>
-              <a:t>4/28/2017</a:t>
+              <a:t>8/18/2016</a:t>
             </a:fld>
             <a:endParaRPr lang="en-US"/>
           </a:p>
@@ -2080,7 +2080,7 @@
           <a:p>
             <a:fld id="{81AA1A57-BA19-4BF1-99AE-E8ABE920CB96}" type="datetimeFigureOut">
               <a:rPr lang="en-US" smtClean="0"/>
-              <a:t>4/28/2017</a:t>
+              <a:t>8/18/2016</a:t>
             </a:fld>
             <a:endParaRPr lang="en-US"/>
           </a:p>
@@ -2332,7 +2332,7 @@
           <a:p>
             <a:fld id="{81AA1A57-BA19-4BF1-99AE-E8ABE920CB96}" type="datetimeFigureOut">
               <a:rPr lang="en-US" smtClean="0"/>
-              <a:t>4/28/2017</a:t>
+              <a:t>8/18/2016</a:t>
             </a:fld>
             <a:endParaRPr lang="en-US"/>
           </a:p>
@@ -2543,7 +2543,7 @@
           <a:p>
             <a:fld id="{81AA1A57-BA19-4BF1-99AE-E8ABE920CB96}" type="datetimeFigureOut">
               <a:rPr lang="en-US" smtClean="0"/>
-              <a:t>4/28/2017</a:t>
+              <a:t>8/18/2016</a:t>
             </a:fld>
             <a:endParaRPr lang="en-US"/>
           </a:p>
@@ -3054,168 +3054,6 @@
           </a:p>
         </p:txBody>
       </p:sp>
-      <p:sp>
-        <p:nvSpPr>
-          <p:cNvPr id="4" name="Donut 3"/>
-          <p:cNvSpPr/>
-          <p:nvPr/>
-        </p:nvSpPr>
-        <p:spPr>
-          <a:xfrm>
-            <a:off x="653249" y="1376618"/>
-            <a:ext cx="914400" cy="914400"/>
-          </a:xfrm>
-          <a:prstGeom prst="donut">
-            <a:avLst>
-              <a:gd name="adj" fmla="val 6613"/>
-            </a:avLst>
-          </a:prstGeom>
-          <a:ln>
-            <a:noFill/>
-          </a:ln>
-          <a:effectLst>
-            <a:outerShdw blurRad="63500" sx="102000" sy="102000" algn="ctr" rotWithShape="0">
-              <a:prstClr val="black">
-                <a:alpha val="40000"/>
-              </a:prstClr>
-            </a:outerShdw>
-          </a:effectLst>
-        </p:spPr>
-        <p:style>
-          <a:lnRef idx="2">
-            <a:schemeClr val="accent6">
-              <a:shade val="50000"/>
-            </a:schemeClr>
-          </a:lnRef>
-          <a:fillRef idx="1">
-            <a:schemeClr val="accent6"/>
-          </a:fillRef>
-          <a:effectRef idx="0">
-            <a:schemeClr val="accent6"/>
-          </a:effectRef>
-          <a:fontRef idx="minor">
-            <a:schemeClr val="lt1"/>
-          </a:fontRef>
-        </p:style>
-        <p:txBody>
-          <a:bodyPr rtlCol="0" anchor="ctr"/>
-          <a:lstStyle/>
-          <a:p>
-            <a:pPr algn="ctr"/>
-            <a:endParaRPr lang="en-US">
-              <a:solidFill>
-                <a:schemeClr val="tx1"/>
-              </a:solidFill>
-            </a:endParaRPr>
-          </a:p>
-        </p:txBody>
-      </p:sp>
-      <p:sp>
-        <p:nvSpPr>
-          <p:cNvPr id="5" name="TextBox 4"/>
-          <p:cNvSpPr txBox="1"/>
-          <p:nvPr/>
-        </p:nvSpPr>
-        <p:spPr>
-          <a:xfrm>
-            <a:off x="653249" y="112609"/>
-            <a:ext cx="870751" cy="1015663"/>
-          </a:xfrm>
-          <a:prstGeom prst="rect">
-            <a:avLst/>
-          </a:prstGeom>
-          <a:noFill/>
-        </p:spPr>
-        <p:txBody>
-          <a:bodyPr wrap="none" rtlCol="0">
-            <a:spAutoFit/>
-          </a:bodyPr>
-          <a:lstStyle/>
-          <a:p>
-            <a:r>
-              <a:rPr lang="en-US" sz="6000" b="1" dirty="0" smtClean="0">
-                <a:solidFill>
-                  <a:schemeClr val="accent6"/>
-                </a:solidFill>
-                <a:effectLst>
-                  <a:outerShdw blurRad="63500" sx="102000" sy="102000" algn="ctr" rotWithShape="0">
-                    <a:prstClr val="black">
-                      <a:alpha val="40000"/>
-                    </a:prstClr>
-                  </a:outerShdw>
-                </a:effectLst>
-                <a:sym typeface="Wingdings" panose="05000000000000000000" pitchFamily="2" charset="2"/>
-              </a:rPr>
-              <a:t></a:t>
-            </a:r>
-            <a:endParaRPr lang="en-US" sz="6000" b="1" dirty="0">
-              <a:solidFill>
-                <a:schemeClr val="accent6"/>
-              </a:solidFill>
-              <a:effectLst>
-                <a:outerShdw blurRad="63500" sx="102000" sy="102000" algn="ctr" rotWithShape="0">
-                  <a:prstClr val="black">
-                    <a:alpha val="40000"/>
-                  </a:prstClr>
-                </a:outerShdw>
-              </a:effectLst>
-            </a:endParaRPr>
-          </a:p>
-        </p:txBody>
-      </p:sp>
-      <p:sp>
-        <p:nvSpPr>
-          <p:cNvPr id="6" name="TextBox 5"/>
-          <p:cNvSpPr txBox="1"/>
-          <p:nvPr/>
-        </p:nvSpPr>
-        <p:spPr>
-          <a:xfrm>
-            <a:off x="694124" y="1423033"/>
-            <a:ext cx="788999" cy="1015663"/>
-          </a:xfrm>
-          <a:prstGeom prst="rect">
-            <a:avLst/>
-          </a:prstGeom>
-          <a:noFill/>
-        </p:spPr>
-        <p:txBody>
-          <a:bodyPr wrap="none" rtlCol="0">
-            <a:spAutoFit/>
-          </a:bodyPr>
-          <a:lstStyle/>
-          <a:p>
-            <a:r>
-              <a:rPr lang="en-US" sz="6000" b="1" dirty="0">
-                <a:solidFill>
-                  <a:schemeClr val="accent6"/>
-                </a:solidFill>
-                <a:effectLst>
-                  <a:outerShdw blurRad="63500" sx="102000" sy="102000" algn="ctr" rotWithShape="0">
-                    <a:prstClr val="black">
-                      <a:alpha val="40000"/>
-                    </a:prstClr>
-                  </a:outerShdw>
-                </a:effectLst>
-                <a:sym typeface="Wingdings" panose="05000000000000000000" pitchFamily="2" charset="2"/>
-              </a:rPr>
-              <a:t></a:t>
-            </a:r>
-            <a:endParaRPr lang="en-US" sz="6000" b="1" dirty="0">
-              <a:solidFill>
-                <a:schemeClr val="accent6"/>
-              </a:solidFill>
-              <a:effectLst>
-                <a:outerShdw blurRad="63500" sx="102000" sy="102000" algn="ctr" rotWithShape="0">
-                  <a:prstClr val="black">
-                    <a:alpha val="40000"/>
-                  </a:prstClr>
-                </a:outerShdw>
-              </a:effectLst>
-            </a:endParaRPr>
-          </a:p>
-        </p:txBody>
-      </p:sp>
     </p:spTree>
     <p:extLst>
       <p:ext uri="{BB962C8B-B14F-4D97-AF65-F5344CB8AC3E}">

</xml_diff>